<commit_message>
beagle bone added to automation
</commit_message>
<xml_diff>
--- a/ooma/homemonitoring/docs/Home Security.pptx
+++ b/ooma/homemonitoring/docs/Home Security.pptx
@@ -298,7 +298,7 @@
           <a:p>
             <a:fld id="{B138BF8A-B091-C24E-84D7-4D632C0A4011}" type="datetimeFigureOut">
               <a:rPr lang="en-US" smtClean="0"/>
-              <a:t>3/25/17</a:t>
+              <a:t>3/27/17</a:t>
             </a:fld>
             <a:endParaRPr lang="en-US"/>
           </a:p>
@@ -468,7 +468,7 @@
           <a:p>
             <a:fld id="{B138BF8A-B091-C24E-84D7-4D632C0A4011}" type="datetimeFigureOut">
               <a:rPr lang="en-US" smtClean="0"/>
-              <a:t>3/25/17</a:t>
+              <a:t>3/27/17</a:t>
             </a:fld>
             <a:endParaRPr lang="en-US"/>
           </a:p>
@@ -648,7 +648,7 @@
           <a:p>
             <a:fld id="{B138BF8A-B091-C24E-84D7-4D632C0A4011}" type="datetimeFigureOut">
               <a:rPr lang="en-US" smtClean="0"/>
-              <a:t>3/25/17</a:t>
+              <a:t>3/27/17</a:t>
             </a:fld>
             <a:endParaRPr lang="en-US"/>
           </a:p>
@@ -818,7 +818,7 @@
           <a:p>
             <a:fld id="{B138BF8A-B091-C24E-84D7-4D632C0A4011}" type="datetimeFigureOut">
               <a:rPr lang="en-US" smtClean="0"/>
-              <a:t>3/25/17</a:t>
+              <a:t>3/27/17</a:t>
             </a:fld>
             <a:endParaRPr lang="en-US"/>
           </a:p>
@@ -1064,7 +1064,7 @@
           <a:p>
             <a:fld id="{B138BF8A-B091-C24E-84D7-4D632C0A4011}" type="datetimeFigureOut">
               <a:rPr lang="en-US" smtClean="0"/>
-              <a:t>3/25/17</a:t>
+              <a:t>3/27/17</a:t>
             </a:fld>
             <a:endParaRPr lang="en-US"/>
           </a:p>
@@ -1352,7 +1352,7 @@
           <a:p>
             <a:fld id="{B138BF8A-B091-C24E-84D7-4D632C0A4011}" type="datetimeFigureOut">
               <a:rPr lang="en-US" smtClean="0"/>
-              <a:t>3/25/17</a:t>
+              <a:t>3/27/17</a:t>
             </a:fld>
             <a:endParaRPr lang="en-US"/>
           </a:p>
@@ -1774,7 +1774,7 @@
           <a:p>
             <a:fld id="{B138BF8A-B091-C24E-84D7-4D632C0A4011}" type="datetimeFigureOut">
               <a:rPr lang="en-US" smtClean="0"/>
-              <a:t>3/25/17</a:t>
+              <a:t>3/27/17</a:t>
             </a:fld>
             <a:endParaRPr lang="en-US"/>
           </a:p>
@@ -1892,7 +1892,7 @@
           <a:p>
             <a:fld id="{B138BF8A-B091-C24E-84D7-4D632C0A4011}" type="datetimeFigureOut">
               <a:rPr lang="en-US" smtClean="0"/>
-              <a:t>3/25/17</a:t>
+              <a:t>3/27/17</a:t>
             </a:fld>
             <a:endParaRPr lang="en-US"/>
           </a:p>
@@ -1987,7 +1987,7 @@
           <a:p>
             <a:fld id="{B138BF8A-B091-C24E-84D7-4D632C0A4011}" type="datetimeFigureOut">
               <a:rPr lang="en-US" smtClean="0"/>
-              <a:t>3/25/17</a:t>
+              <a:t>3/27/17</a:t>
             </a:fld>
             <a:endParaRPr lang="en-US"/>
           </a:p>
@@ -2264,7 +2264,7 @@
           <a:p>
             <a:fld id="{B138BF8A-B091-C24E-84D7-4D632C0A4011}" type="datetimeFigureOut">
               <a:rPr lang="en-US" smtClean="0"/>
-              <a:t>3/25/17</a:t>
+              <a:t>3/27/17</a:t>
             </a:fld>
             <a:endParaRPr lang="en-US"/>
           </a:p>
@@ -2517,7 +2517,7 @@
           <a:p>
             <a:fld id="{B138BF8A-B091-C24E-84D7-4D632C0A4011}" type="datetimeFigureOut">
               <a:rPr lang="en-US" smtClean="0"/>
-              <a:t>3/25/17</a:t>
+              <a:t>3/27/17</a:t>
             </a:fld>
             <a:endParaRPr lang="en-US"/>
           </a:p>
@@ -2730,7 +2730,7 @@
           <a:p>
             <a:fld id="{B138BF8A-B091-C24E-84D7-4D632C0A4011}" type="datetimeFigureOut">
               <a:rPr lang="en-US" smtClean="0"/>
-              <a:t>3/25/17</a:t>
+              <a:t>3/27/17</a:t>
             </a:fld>
             <a:endParaRPr lang="en-US"/>
           </a:p>
@@ -3184,6 +3184,13 @@
   <p:clrMapOvr>
     <a:masterClrMapping/>
   </p:clrMapOvr>
+  <p:timing>
+    <p:tnLst>
+      <p:par>
+        <p:cTn xmlns:p14="http://schemas.microsoft.com/office/powerpoint/2010/main" id="1" dur="indefinite" restart="never" nodeType="tmRoot"/>
+      </p:par>
+    </p:tnLst>
+  </p:timing>
 </p:sld>
 </file>
 
@@ -3228,7 +3235,11 @@
           <a:p>
             <a:r>
               <a:rPr lang="en-US" dirty="0" smtClean="0"/>
-              <a:t>Test case – Trigger Tampering </a:t>
+              <a:t>Test case – </a:t>
+            </a:r>
+            <a:r>
+              <a:rPr lang="en-US" dirty="0" smtClean="0"/>
+              <a:t>Verifying Sensor Events </a:t>
             </a:r>
             <a:endParaRPr lang="en-US" dirty="0"/>
           </a:p>
@@ -5781,7 +5792,11 @@
           <a:p>
             <a:r>
               <a:rPr lang="en-US" dirty="0" smtClean="0"/>
-              <a:t>Beagle bone for emulating Sensors</a:t>
+              <a:t>Beagle bone for </a:t>
+            </a:r>
+            <a:r>
+              <a:rPr lang="en-US" dirty="0" smtClean="0"/>
+              <a:t>controlling the Sensors [generating events]</a:t>
             </a:r>
             <a:endParaRPr lang="en-US" dirty="0"/>
           </a:p>
@@ -5869,41 +5884,19 @@
           <a:p>
             <a:r>
               <a:rPr lang="en-US" dirty="0" smtClean="0"/>
-              <a:t>Fast </a:t>
+              <a:t>Fast</a:t>
             </a:r>
           </a:p>
           <a:p>
             <a:r>
               <a:rPr lang="en-US" dirty="0" smtClean="0"/>
-              <a:t>Really no need to follow </a:t>
+              <a:t>Leverage with current CI, </a:t>
             </a:r>
             <a:r>
               <a:rPr lang="en-US" dirty="0" err="1" smtClean="0"/>
-              <a:t>mvc</a:t>
-            </a:r>
-            <a:r>
-              <a:rPr lang="en-US" dirty="0" smtClean="0"/>
-              <a:t> or </a:t>
-            </a:r>
-            <a:r>
-              <a:rPr lang="en-US" dirty="0" err="1" smtClean="0"/>
-              <a:t>mtv</a:t>
-            </a:r>
-            <a:r>
-              <a:rPr lang="en-US" dirty="0" smtClean="0"/>
-              <a:t>.</a:t>
-            </a:r>
-          </a:p>
-          <a:p>
-            <a:r>
-              <a:rPr lang="en-US" dirty="0" err="1" smtClean="0"/>
-              <a:t>Django</a:t>
-            </a:r>
-            <a:r>
-              <a:rPr lang="en-US" dirty="0" smtClean="0"/>
-              <a:t> needs deep learning curve.</a:t>
-            </a:r>
-            <a:endParaRPr lang="en-US" dirty="0"/>
+              <a:t>jenkins</a:t>
+            </a:r>
+            <a:endParaRPr lang="en-US" dirty="0" smtClean="0"/>
           </a:p>
         </p:txBody>
       </p:sp>
@@ -5961,7 +5954,7 @@
           <a:p>
             <a:r>
               <a:rPr lang="en-US" dirty="0" smtClean="0"/>
-              <a:t>REST APIs</a:t>
+              <a:t>Verification of</a:t>
             </a:r>
             <a:endParaRPr lang="en-US" dirty="0"/>
           </a:p>
@@ -6925,7 +6918,19 @@
           <a:p>
             <a:r>
               <a:rPr lang="en-US" dirty="0" smtClean="0"/>
-              <a:t>Test case – Trigger Pairing Mode </a:t>
+              <a:t>Test case – </a:t>
+            </a:r>
+            <a:r>
+              <a:rPr lang="en-US" dirty="0" smtClean="0"/>
+              <a:t>Verifying </a:t>
+            </a:r>
+            <a:r>
+              <a:rPr lang="en-US" dirty="0" smtClean="0"/>
+              <a:t>Pairing </a:t>
+            </a:r>
+            <a:r>
+              <a:rPr lang="en-US" dirty="0" smtClean="0"/>
+              <a:t>Flow </a:t>
             </a:r>
             <a:endParaRPr lang="en-US" dirty="0"/>
           </a:p>

</xml_diff>